<commit_message>
change github url in the slides
</commit_message>
<xml_diff>
--- a/async-await.pptx
+++ b/async-await.pptx
@@ -303,7 +303,7 @@
           <a:p>
             <a:fld id="{EC13577B-6902-467D-A26C-08A0DD5E4E03}" type="datetimeFigureOut">
               <a:rPr lang="en-US" smtClean="0"/>
-              <a:t>27-Sep-17</a:t>
+              <a:t>28-Sep-17</a:t>
             </a:fld>
             <a:endParaRPr lang="en-US"/>
           </a:p>
@@ -3710,7 +3710,7 @@
           <a:p>
             <a:fld id="{14F69C31-C159-4D81-B5B5-D929E6250160}" type="datetime1">
               <a:rPr lang="en-US" smtClean="0"/>
-              <a:t>27-Sep-17</a:t>
+              <a:t>28-Sep-17</a:t>
             </a:fld>
             <a:endParaRPr lang="en-US"/>
           </a:p>
@@ -4011,7 +4011,7 @@
           <a:p>
             <a:fld id="{95DECF32-A33A-4BCE-9AE4-37DACDD84889}" type="datetime1">
               <a:rPr lang="en-US" smtClean="0"/>
-              <a:t>27-Sep-17</a:t>
+              <a:t>28-Sep-17</a:t>
             </a:fld>
             <a:endParaRPr lang="en-US"/>
           </a:p>
@@ -4240,7 +4240,7 @@
           <a:p>
             <a:fld id="{1A0BF18E-0818-4FA1-9F79-ABB93115FDC6}" type="datetime1">
               <a:rPr lang="en-US" smtClean="0"/>
-              <a:t>27-Sep-17</a:t>
+              <a:t>28-Sep-17</a:t>
             </a:fld>
             <a:endParaRPr lang="en-US"/>
           </a:p>
@@ -4521,7 +4521,7 @@
           <a:p>
             <a:fld id="{976EE2FA-DC47-4093-90AA-CD5D8CD786E8}" type="datetime1">
               <a:rPr lang="en-US" smtClean="0"/>
-              <a:t>27-Sep-17</a:t>
+              <a:t>28-Sep-17</a:t>
             </a:fld>
             <a:endParaRPr lang="en-US"/>
           </a:p>
@@ -4882,7 +4882,7 @@
           <a:p>
             <a:fld id="{3F758D0F-AFCF-4C4E-ADC5-3B60D42376FB}" type="datetime1">
               <a:rPr lang="en-US" smtClean="0"/>
-              <a:t>27-Sep-17</a:t>
+              <a:t>28-Sep-17</a:t>
             </a:fld>
             <a:endParaRPr lang="en-US"/>
           </a:p>
@@ -5182,7 +5182,7 @@
           <a:p>
             <a:fld id="{663377B1-3DEA-4B2F-9CB1-C0F1BF8FF893}" type="datetime1">
               <a:rPr lang="en-US" smtClean="0"/>
-              <a:t>27-Sep-17</a:t>
+              <a:t>28-Sep-17</a:t>
             </a:fld>
             <a:endParaRPr lang="en-US"/>
           </a:p>
@@ -5695,7 +5695,7 @@
           <a:p>
             <a:fld id="{59492E3C-EE86-472F-B4CB-41BB596651EB}" type="datetime1">
               <a:rPr lang="en-US" smtClean="0"/>
-              <a:t>27-Sep-17</a:t>
+              <a:t>28-Sep-17</a:t>
             </a:fld>
             <a:endParaRPr lang="en-US"/>
           </a:p>
@@ -6338,7 +6338,7 @@
           <a:p>
             <a:fld id="{AD79C5C0-BC5A-446D-84FB-4402A3ABF165}" type="datetime1">
               <a:rPr lang="en-US" smtClean="0"/>
-              <a:t>27-Sep-17</a:t>
+              <a:t>28-Sep-17</a:t>
             </a:fld>
             <a:endParaRPr lang="en-US"/>
           </a:p>
@@ -6563,7 +6563,7 @@
           <a:p>
             <a:fld id="{8CA84F71-0CAB-451B-8546-3D39D912A807}" type="datetime1">
               <a:rPr lang="en-US" smtClean="0"/>
-              <a:t>27-Sep-17</a:t>
+              <a:t>28-Sep-17</a:t>
             </a:fld>
             <a:endParaRPr lang="en-US"/>
           </a:p>
@@ -6750,7 +6750,7 @@
           <a:p>
             <a:fld id="{8CA84F71-0CAB-451B-8546-3D39D912A807}" type="datetime1">
               <a:rPr lang="en-US" smtClean="0"/>
-              <a:t>27-Sep-17</a:t>
+              <a:t>28-Sep-17</a:t>
             </a:fld>
             <a:endParaRPr lang="en-US"/>
           </a:p>
@@ -6891,7 +6891,7 @@
           <a:p>
             <a:fld id="{DE5426E6-6CA2-406C-8787-947FA53021CA}" type="datetime1">
               <a:rPr lang="en-US" smtClean="0"/>
-              <a:t>27-Sep-17</a:t>
+              <a:t>28-Sep-17</a:t>
             </a:fld>
             <a:endParaRPr lang="en-US"/>
           </a:p>
@@ -7226,7 +7226,7 @@
           <a:p>
             <a:fld id="{6DCE4C5F-4B75-448B-B808-BF2A9726754B}" type="datetime1">
               <a:rPr lang="en-US" smtClean="0"/>
-              <a:t>27-Sep-17</a:t>
+              <a:t>28-Sep-17</a:t>
             </a:fld>
             <a:endParaRPr lang="en-US"/>
           </a:p>
@@ -7437,7 +7437,7 @@
           <a:p>
             <a:fld id="{068FCF95-8B99-408F-9459-8C8853FFC3BF}" type="datetime1">
               <a:rPr lang="en-US" smtClean="0"/>
-              <a:t>27-Sep-17</a:t>
+              <a:t>28-Sep-17</a:t>
             </a:fld>
             <a:endParaRPr lang="en-US"/>
           </a:p>
@@ -13832,7 +13832,7 @@
         <p:spPr>
           <a:xfrm>
             <a:off x="604434" y="3596027"/>
-            <a:ext cx="9114162" cy="1200329"/>
+            <a:ext cx="9600705" cy="1200329"/>
           </a:xfrm>
           <a:prstGeom prst="rect">
             <a:avLst/>
@@ -13849,10 +13849,10 @@
               <a:buChar char="•"/>
             </a:pPr>
             <a:r>
-              <a:rPr lang="ru-RU" sz="2400" dirty="0">
+              <a:rPr lang="en-US" sz="2400" dirty="0">
                 <a:hlinkClick r:id="rId3"/>
               </a:rPr>
-              <a:t>https://github.com/egorikas/ItSreda</a:t>
+              <a:t>https://github.com/egorikas/SpbDotNet</a:t>
             </a:r>
             <a:r>
               <a:rPr lang="en-US" sz="2400" dirty="0"/>
@@ -13869,8 +13869,14 @@
               <a:buChar char="•"/>
             </a:pPr>
             <a:r>
+              <a:rPr lang="en-US" sz="2400" dirty="0">
+                <a:hlinkClick r:id="rId4"/>
+              </a:rPr>
+              <a:t>egorikas.com </a:t>
+            </a:r>
+            <a:r>
               <a:rPr lang="en-US" sz="2400" dirty="0"/>
-              <a:t>egorikas.com – </a:t>
+              <a:t>– </a:t>
             </a:r>
             <a:r>
               <a:rPr lang="ru-RU" sz="2400" dirty="0"/>
@@ -13884,7 +13890,7 @@
             </a:pPr>
             <a:r>
               <a:rPr lang="en-US" sz="2400" dirty="0">
-                <a:hlinkClick r:id="rId4"/>
+                <a:hlinkClick r:id="rId5"/>
               </a:rPr>
               <a:t>egorgrishechko@gmail.com</a:t>
             </a:r>

</xml_diff>